<commit_message>
Finish this round of update with the debug section update
</commit_message>
<xml_diff>
--- a/preliminary/Working/presentations/KeyStoneII ARM Overview.pptx
+++ b/preliminary/Working/presentations/KeyStoneII ARM Overview.pptx
@@ -5,10 +5,10 @@
     <p:sldMasterId id="2147484452" r:id="rId5"/>
   </p:sldMasterIdLst>
   <p:notesMasterIdLst>
-    <p:notesMasterId r:id="rId61"/>
+    <p:notesMasterId r:id="rId62"/>
   </p:notesMasterIdLst>
   <p:handoutMasterIdLst>
-    <p:handoutMasterId r:id="rId62"/>
+    <p:handoutMasterId r:id="rId63"/>
   </p:handoutMasterIdLst>
   <p:sldIdLst>
     <p:sldId id="868" r:id="rId6"/>
@@ -64,13 +64,14 @@
     <p:sldId id="904" r:id="rId56"/>
     <p:sldId id="905" r:id="rId57"/>
     <p:sldId id="906" r:id="rId58"/>
-    <p:sldId id="907" r:id="rId59"/>
-    <p:sldId id="908" r:id="rId60"/>
+    <p:sldId id="924" r:id="rId59"/>
+    <p:sldId id="907" r:id="rId60"/>
+    <p:sldId id="908" r:id="rId61"/>
   </p:sldIdLst>
   <p:sldSz cx="9144000" cy="6858000" type="screen4x3"/>
   <p:notesSz cx="7010400" cy="9296400"/>
   <p:custDataLst>
-    <p:tags r:id="rId63"/>
+    <p:tags r:id="rId64"/>
   </p:custDataLst>
   <p:defaultTextStyle>
     <a:defPPr>
@@ -1491,6 +1492,10 @@
           </a:bodyPr>
           <a:lstStyle/>
           <a:p>
+            <a:r>
+              <a:rPr lang="en-US" dirty="0" smtClean="0"/>
+              <a:t>Distribution and CPU interface</a:t>
+            </a:r>
             <a:endParaRPr lang="en-US" dirty="0"/>
           </a:p>
         </p:txBody>
@@ -1518,7 +1523,7 @@
               <a:pPr>
                 <a:defRPr/>
               </a:pPr>
-              <a:t>38</a:t>
+              <a:t>37</a:t>
             </a:fld>
             <a:endParaRPr lang="en-US" dirty="0"/>
           </a:p>
@@ -1605,7 +1610,7 @@
               <a:pPr>
                 <a:defRPr/>
               </a:pPr>
-              <a:t>39</a:t>
+              <a:t>38</a:t>
             </a:fld>
             <a:endParaRPr lang="en-US" dirty="0"/>
           </a:p>
@@ -1684,10 +1689,15 @@
           <a:bodyPr/>
           <a:lstStyle/>
           <a:p>
-            <a:fld id="{9295E5E2-942B-4086-8EFE-9DF4A2A8CF3E}" type="slidenum">
+            <a:pPr>
+              <a:defRPr/>
+            </a:pPr>
+            <a:fld id="{9AF68C97-DBEA-40B2-91B6-F690EAC6BBD6}" type="slidenum">
               <a:rPr lang="en-US" smtClean="0"/>
-              <a:pPr/>
-              <a:t>42</a:t>
+              <a:pPr>
+                <a:defRPr/>
+              </a:pPr>
+              <a:t>39</a:t>
             </a:fld>
             <a:endParaRPr lang="en-US" dirty="0"/>
           </a:p>
@@ -1747,14 +1757,6 @@
           </a:bodyPr>
           <a:lstStyle/>
           <a:p>
-            <a:r>
-              <a:rPr lang="en-US" dirty="0" smtClean="0"/>
-              <a:t>Depending on the transistor</a:t>
-            </a:r>
-            <a:r>
-              <a:rPr lang="en-US" baseline="0" dirty="0" smtClean="0"/>
-              <a:t> temperature, static power (leakage) is ½ to 2/3 of total power. Dynamic power scales with clock speed, static does not.</a:t>
-            </a:r>
             <a:endParaRPr lang="en-US" dirty="0"/>
           </a:p>
         </p:txBody>
@@ -1777,7 +1779,7 @@
             <a:fld id="{9295E5E2-942B-4086-8EFE-9DF4A2A8CF3E}" type="slidenum">
               <a:rPr lang="en-US" smtClean="0"/>
               <a:pPr/>
-              <a:t>43</a:t>
+              <a:t>42</a:t>
             </a:fld>
             <a:endParaRPr lang="en-US" dirty="0"/>
           </a:p>
@@ -1837,6 +1839,14 @@
           </a:bodyPr>
           <a:lstStyle/>
           <a:p>
+            <a:r>
+              <a:rPr lang="en-US" dirty="0" smtClean="0"/>
+              <a:t>Depending on the transistor</a:t>
+            </a:r>
+            <a:r>
+              <a:rPr lang="en-US" baseline="0" dirty="0" smtClean="0"/>
+              <a:t> temperature, static power (leakage) is ½ to 2/3 of total power. Dynamic power scales with clock speed, static does not.</a:t>
+            </a:r>
             <a:endParaRPr lang="en-US" dirty="0"/>
           </a:p>
         </p:txBody>
@@ -1856,10 +1866,10 @@
           <a:bodyPr/>
           <a:lstStyle/>
           <a:p>
-            <a:fld id="{5A66AFF2-6912-47BF-8417-4BCCFAB39D19}" type="slidenum">
+            <a:fld id="{9295E5E2-942B-4086-8EFE-9DF4A2A8CF3E}" type="slidenum">
               <a:rPr lang="en-US" smtClean="0"/>
               <a:pPr/>
-              <a:t>44</a:t>
+              <a:t>43</a:t>
             </a:fld>
             <a:endParaRPr lang="en-US" dirty="0"/>
           </a:p>
@@ -1938,10 +1948,10 @@
           <a:bodyPr/>
           <a:lstStyle/>
           <a:p>
-            <a:fld id="{9295E5E2-942B-4086-8EFE-9DF4A2A8CF3E}" type="slidenum">
+            <a:fld id="{5A66AFF2-6912-47BF-8417-4BCCFAB39D19}" type="slidenum">
               <a:rPr lang="en-US" smtClean="0"/>
               <a:pPr/>
-              <a:t>45</a:t>
+              <a:t>44</a:t>
             </a:fld>
             <a:endParaRPr lang="en-US" dirty="0"/>
           </a:p>
@@ -2204,7 +2214,7 @@
             <a:fld id="{9295E5E2-942B-4086-8EFE-9DF4A2A8CF3E}" type="slidenum">
               <a:rPr lang="en-US" smtClean="0"/>
               <a:pPr/>
-              <a:t>46</a:t>
+              <a:t>45</a:t>
             </a:fld>
             <a:endParaRPr lang="en-US" dirty="0"/>
           </a:p>
@@ -2286,7 +2296,7 @@
             <a:fld id="{9295E5E2-942B-4086-8EFE-9DF4A2A8CF3E}" type="slidenum">
               <a:rPr lang="en-US" smtClean="0"/>
               <a:pPr/>
-              <a:t>48</a:t>
+              <a:t>46</a:t>
             </a:fld>
             <a:endParaRPr lang="en-US" dirty="0"/>
           </a:p>
@@ -2368,7 +2378,7 @@
             <a:fld id="{9295E5E2-942B-4086-8EFE-9DF4A2A8CF3E}" type="slidenum">
               <a:rPr lang="en-US" smtClean="0"/>
               <a:pPr/>
-              <a:t>49</a:t>
+              <a:t>48</a:t>
             </a:fld>
             <a:endParaRPr lang="en-US" dirty="0"/>
           </a:p>
@@ -2450,7 +2460,7 @@
             <a:fld id="{9295E5E2-942B-4086-8EFE-9DF4A2A8CF3E}" type="slidenum">
               <a:rPr lang="en-US" smtClean="0"/>
               <a:pPr/>
-              <a:t>51</a:t>
+              <a:t>49</a:t>
             </a:fld>
             <a:endParaRPr lang="en-US" dirty="0"/>
           </a:p>
@@ -2510,10 +2520,6 @@
           </a:bodyPr>
           <a:lstStyle/>
           <a:p>
-            <a:r>
-              <a:rPr lang="en-US" dirty="0" smtClean="0"/>
-              <a:t>ECT   - Embedded Cross Triggering</a:t>
-            </a:r>
             <a:endParaRPr lang="en-US" dirty="0"/>
           </a:p>
         </p:txBody>
@@ -2536,7 +2542,7 @@
             <a:fld id="{9295E5E2-942B-4086-8EFE-9DF4A2A8CF3E}" type="slidenum">
               <a:rPr lang="en-US" smtClean="0"/>
               <a:pPr/>
-              <a:t>52</a:t>
+              <a:t>51</a:t>
             </a:fld>
             <a:endParaRPr lang="en-US" dirty="0"/>
           </a:p>
@@ -2596,6 +2602,10 @@
           </a:bodyPr>
           <a:lstStyle/>
           <a:p>
+            <a:r>
+              <a:rPr lang="en-US" dirty="0" smtClean="0"/>
+              <a:t>ECT   - Embedded Cross Triggering</a:t>
+            </a:r>
             <a:endParaRPr lang="en-US" dirty="0"/>
           </a:p>
         </p:txBody>
@@ -2618,7 +2628,7 @@
             <a:fld id="{9295E5E2-942B-4086-8EFE-9DF4A2A8CF3E}" type="slidenum">
               <a:rPr lang="en-US" smtClean="0"/>
               <a:pPr/>
-              <a:t>53</a:t>
+              <a:t>52</a:t>
             </a:fld>
             <a:endParaRPr lang="en-US" dirty="0"/>
           </a:p>
@@ -2678,37 +2688,6 @@
           </a:bodyPr>
           <a:lstStyle/>
           <a:p>
-            <a:r>
-              <a:rPr lang="en-US" dirty="0" smtClean="0"/>
-              <a:t>Yellow area is the standard quad A15 MPCore with 4MB of shared coherent cache, each core is</a:t>
-            </a:r>
-            <a:r>
-              <a:rPr lang="en-US" baseline="0" dirty="0" smtClean="0"/>
-              <a:t> in its own power switched domain and the MPCore with L2 cache is in a further power switched domain</a:t>
-            </a:r>
-            <a:endParaRPr lang="en-US" dirty="0" smtClean="0"/>
-          </a:p>
-          <a:p>
-            <a:r>
-              <a:rPr lang="en-US" dirty="0" smtClean="0"/>
-              <a:t>GIC-400 is the standard interrupt controller from ARM</a:t>
-            </a:r>
-          </a:p>
-          <a:p>
-            <a:r>
-              <a:rPr lang="en-US" dirty="0" smtClean="0"/>
-              <a:t>The</a:t>
-            </a:r>
-            <a:r>
-              <a:rPr lang="en-US" baseline="0" dirty="0" smtClean="0"/>
-              <a:t> path the cores and caches do memory reads and writes goes through Eagles Nest to MSMC. Snooping by MSMC use this path as well</a:t>
-            </a:r>
-          </a:p>
-          <a:p>
-            <a:r>
-              <a:rPr lang="en-US" baseline="0" dirty="0" smtClean="0"/>
-              <a:t>The rest of the interfaces are related to clocking, debugging, tracing, and production testing.</a:t>
-            </a:r>
             <a:endParaRPr lang="en-US" dirty="0"/>
           </a:p>
         </p:txBody>
@@ -2731,7 +2710,7 @@
             <a:fld id="{9295E5E2-942B-4086-8EFE-9DF4A2A8CF3E}" type="slidenum">
               <a:rPr lang="en-US" smtClean="0"/>
               <a:pPr/>
-              <a:t>54</a:t>
+              <a:t>53</a:t>
             </a:fld>
             <a:endParaRPr lang="en-US" dirty="0"/>
           </a:p>
@@ -2810,6 +2789,201 @@
           <a:bodyPr/>
           <a:lstStyle/>
           <a:p>
+            <a:fld id="{9295E5E2-942B-4086-8EFE-9DF4A2A8CF3E}" type="slidenum">
+              <a:rPr lang="en-US" smtClean="0"/>
+              <a:pPr/>
+              <a:t>54</a:t>
+            </a:fld>
+            <a:endParaRPr lang="en-US" dirty="0"/>
+          </a:p>
+        </p:txBody>
+      </p:sp>
+    </p:spTree>
+  </p:cSld>
+  <p:clrMapOvr>
+    <a:masterClrMapping/>
+  </p:clrMapOvr>
+</p:notes>
+</file>
+
+<file path=ppt/notesSlides/notesSlide28.xml><?xml version="1.0" encoding="utf-8"?>
+<p:notes xmlns:a="http://schemas.openxmlformats.org/drawingml/2006/main" xmlns:r="http://schemas.openxmlformats.org/officeDocument/2006/relationships" xmlns:p="http://schemas.openxmlformats.org/presentationml/2006/main">
+  <p:cSld>
+    <p:spTree>
+      <p:nvGrpSpPr>
+        <p:cNvPr id="1" name=""/>
+        <p:cNvGrpSpPr/>
+        <p:nvPr/>
+      </p:nvGrpSpPr>
+      <p:grpSpPr>
+        <a:xfrm>
+          <a:off x="0" y="0"/>
+          <a:ext cx="0" cy="0"/>
+          <a:chOff x="0" y="0"/>
+          <a:chExt cx="0" cy="0"/>
+        </a:xfrm>
+      </p:grpSpPr>
+      <p:sp>
+        <p:nvSpPr>
+          <p:cNvPr id="2" name="Slide Image Placeholder 1"/>
+          <p:cNvSpPr>
+            <a:spLocks noGrp="1" noRot="1" noChangeAspect="1"/>
+          </p:cNvSpPr>
+          <p:nvPr>
+            <p:ph type="sldImg"/>
+          </p:nvPr>
+        </p:nvSpPr>
+        <p:spPr/>
+      </p:sp>
+      <p:sp>
+        <p:nvSpPr>
+          <p:cNvPr id="3" name="Notes Placeholder 2"/>
+          <p:cNvSpPr>
+            <a:spLocks noGrp="1"/>
+          </p:cNvSpPr>
+          <p:nvPr>
+            <p:ph type="body" idx="1"/>
+          </p:nvPr>
+        </p:nvSpPr>
+        <p:spPr/>
+        <p:txBody>
+          <a:bodyPr>
+            <a:normAutofit/>
+          </a:bodyPr>
+          <a:lstStyle/>
+          <a:p>
+            <a:r>
+              <a:rPr lang="en-US" dirty="0" smtClean="0"/>
+              <a:t>Yellow area is the standard quad A15 MPCore with 4MB of shared coherent cache, each core is</a:t>
+            </a:r>
+            <a:r>
+              <a:rPr lang="en-US" baseline="0" dirty="0" smtClean="0"/>
+              <a:t> in its own power switched domain and the MPCore with L2 cache is in a further power switched domain</a:t>
+            </a:r>
+            <a:endParaRPr lang="en-US" dirty="0" smtClean="0"/>
+          </a:p>
+          <a:p>
+            <a:r>
+              <a:rPr lang="en-US" dirty="0" smtClean="0"/>
+              <a:t>GIC-400 is the standard interrupt controller from ARM</a:t>
+            </a:r>
+          </a:p>
+          <a:p>
+            <a:r>
+              <a:rPr lang="en-US" dirty="0" smtClean="0"/>
+              <a:t>The</a:t>
+            </a:r>
+            <a:r>
+              <a:rPr lang="en-US" baseline="0" dirty="0" smtClean="0"/>
+              <a:t> path the cores and caches do memory reads and writes goes through Eagles Nest to MSMC. Snooping by MSMC use this path as well</a:t>
+            </a:r>
+          </a:p>
+          <a:p>
+            <a:r>
+              <a:rPr lang="en-US" baseline="0" dirty="0" smtClean="0"/>
+              <a:t>The rest of the interfaces are related to clocking, debugging, tracing, and production testing.</a:t>
+            </a:r>
+            <a:endParaRPr lang="en-US" dirty="0"/>
+          </a:p>
+        </p:txBody>
+      </p:sp>
+      <p:sp>
+        <p:nvSpPr>
+          <p:cNvPr id="4" name="Slide Number Placeholder 3"/>
+          <p:cNvSpPr>
+            <a:spLocks noGrp="1"/>
+          </p:cNvSpPr>
+          <p:nvPr>
+            <p:ph type="sldNum" sz="quarter" idx="10"/>
+          </p:nvPr>
+        </p:nvSpPr>
+        <p:spPr/>
+        <p:txBody>
+          <a:bodyPr/>
+          <a:lstStyle/>
+          <a:p>
+            <a:fld id="{9295E5E2-942B-4086-8EFE-9DF4A2A8CF3E}" type="slidenum">
+              <a:rPr lang="en-US" smtClean="0"/>
+              <a:pPr/>
+              <a:t>55</a:t>
+            </a:fld>
+            <a:endParaRPr lang="en-US" dirty="0"/>
+          </a:p>
+        </p:txBody>
+      </p:sp>
+    </p:spTree>
+  </p:cSld>
+  <p:clrMapOvr>
+    <a:masterClrMapping/>
+  </p:clrMapOvr>
+</p:notes>
+</file>
+
+<file path=ppt/notesSlides/notesSlide29.xml><?xml version="1.0" encoding="utf-8"?>
+<p:notes xmlns:a="http://schemas.openxmlformats.org/drawingml/2006/main" xmlns:r="http://schemas.openxmlformats.org/officeDocument/2006/relationships" xmlns:p="http://schemas.openxmlformats.org/presentationml/2006/main">
+  <p:cSld>
+    <p:spTree>
+      <p:nvGrpSpPr>
+        <p:cNvPr id="1" name=""/>
+        <p:cNvGrpSpPr/>
+        <p:nvPr/>
+      </p:nvGrpSpPr>
+      <p:grpSpPr>
+        <a:xfrm>
+          <a:off x="0" y="0"/>
+          <a:ext cx="0" cy="0"/>
+          <a:chOff x="0" y="0"/>
+          <a:chExt cx="0" cy="0"/>
+        </a:xfrm>
+      </p:grpSpPr>
+      <p:sp>
+        <p:nvSpPr>
+          <p:cNvPr id="2" name="Slide Image Placeholder 1"/>
+          <p:cNvSpPr>
+            <a:spLocks noGrp="1" noRot="1" noChangeAspect="1"/>
+          </p:cNvSpPr>
+          <p:nvPr>
+            <p:ph type="sldImg"/>
+          </p:nvPr>
+        </p:nvSpPr>
+        <p:spPr/>
+      </p:sp>
+      <p:sp>
+        <p:nvSpPr>
+          <p:cNvPr id="3" name="Notes Placeholder 2"/>
+          <p:cNvSpPr>
+            <a:spLocks noGrp="1"/>
+          </p:cNvSpPr>
+          <p:nvPr>
+            <p:ph type="body" idx="1"/>
+          </p:nvPr>
+        </p:nvSpPr>
+        <p:spPr/>
+        <p:txBody>
+          <a:bodyPr>
+            <a:normAutofit/>
+          </a:bodyPr>
+          <a:lstStyle/>
+          <a:p>
+            <a:endParaRPr lang="en-US" dirty="0"/>
+          </a:p>
+        </p:txBody>
+      </p:sp>
+      <p:sp>
+        <p:nvSpPr>
+          <p:cNvPr id="4" name="Slide Number Placeholder 3"/>
+          <p:cNvSpPr>
+            <a:spLocks noGrp="1"/>
+          </p:cNvSpPr>
+          <p:nvPr>
+            <p:ph type="sldNum" sz="quarter" idx="10"/>
+          </p:nvPr>
+        </p:nvSpPr>
+        <p:spPr/>
+        <p:txBody>
+          <a:bodyPr/>
+          <a:lstStyle/>
+          <a:p>
             <a:pPr>
               <a:defRPr/>
             </a:pPr>
@@ -2818,7 +2992,7 @@
               <a:pPr>
                 <a:defRPr/>
               </a:pPr>
-              <a:t>55</a:t>
+              <a:t>56</a:t>
             </a:fld>
             <a:endParaRPr lang="en-US" dirty="0"/>
           </a:p>
@@ -3114,7 +3288,6 @@
               <a:rPr lang="en-US" dirty="0" smtClean="0"/>
               <a:t>The translation between virtual address to physical address is done via two or three steps </a:t>
             </a:r>
-            <a:endParaRPr lang="en-US" dirty="0" smtClean="0"/>
           </a:p>
           <a:p>
             <a:r>
@@ -5965,21 +6138,8 @@
             <a:pPr lvl="1"/>
             <a:r>
               <a:rPr lang="en-US" sz="2400" dirty="0" smtClean="0"/>
-              <a:t>Translation Lookaside Buffers (TLB) </a:t>
-            </a:r>
-            <a:r>
-              <a:rPr lang="en-US" sz="2400" dirty="0" smtClean="0"/>
-              <a:t>caches </a:t>
-            </a:r>
-            <a:r>
-              <a:rPr lang="en-US" sz="2400" dirty="0" smtClean="0"/>
-              <a:t>one page of address translations per entry to speed up translation </a:t>
-            </a:r>
-            <a:r>
-              <a:rPr lang="en-US" sz="2400" dirty="0" smtClean="0"/>
-              <a:t>process (L1 instruction access, L1 data access and L2 TLB)</a:t>
-            </a:r>
-            <a:endParaRPr lang="en-US" sz="2400" dirty="0" smtClean="0"/>
+              <a:t>Translation Lookaside Buffers (TLB) caches one page of address translations per entry to speed up translation process (L1 instruction access, L1 data access and L2 TLB)</a:t>
+            </a:r>
           </a:p>
           <a:p>
             <a:pPr>
@@ -8877,7 +9037,6 @@
               <a:rPr lang="en-US" altLang="ko-KR" sz="3600" dirty="0" smtClean="0"/>
               <a:t>Purpose of Interrupt Controller</a:t>
             </a:r>
-            <a:endParaRPr lang="en-US" altLang="ko-KR" sz="3600" dirty="0" smtClean="0"/>
           </a:p>
         </p:txBody>
       </p:sp>
@@ -8934,7 +9093,6 @@
               <a:rPr lang="en-US" altLang="ko-KR" sz="2000" dirty="0" smtClean="0"/>
               <a:t>Tracking the status of interrupt</a:t>
             </a:r>
-            <a:endParaRPr lang="en-US" altLang="ko-KR" sz="2000" dirty="0" smtClean="0"/>
           </a:p>
         </p:txBody>
       </p:sp>
@@ -8982,7 +9140,7 @@
           </p:nvPr>
         </p:nvPicPr>
         <p:blipFill>
-          <a:blip r:embed="rId2" cstate="print"/>
+          <a:blip r:embed="rId3" cstate="print"/>
           <a:srcRect/>
           <a:stretch>
             <a:fillRect/>
@@ -8990,7 +9148,7 @@
         </p:blipFill>
         <p:spPr bwMode="auto">
           <a:xfrm>
-            <a:off x="1601152" y="651351"/>
+            <a:off x="2804919" y="651351"/>
             <a:ext cx="5962650" cy="4591050"/>
           </a:xfrm>
           <a:prstGeom prst="rect">
@@ -9046,8 +9204,8 @@
         </p:nvSpPr>
         <p:spPr>
           <a:xfrm>
-            <a:off x="335280" y="4533900"/>
-            <a:ext cx="8153400" cy="1866900"/>
+            <a:off x="196383" y="3920441"/>
+            <a:ext cx="8153400" cy="2399336"/>
           </a:xfrm>
         </p:spPr>
         <p:txBody>
@@ -9124,6 +9282,19 @@
                 <a:latin typeface="Arial" pitchFamily="34" charset="0"/>
               </a:rPr>
               <a:t>interrupts</a:t>
+            </a:r>
+          </a:p>
+          <a:p>
+            <a:pPr marL="274320" indent="-274320">
+              <a:spcBef>
+                <a:spcPts val="600"/>
+              </a:spcBef>
+            </a:pPr>
+            <a:r>
+              <a:rPr lang="en-US" altLang="ko-KR" sz="2000" kern="1200" dirty="0" smtClean="0">
+                <a:latin typeface="Arial" pitchFamily="34" charset="0"/>
+              </a:rPr>
+              <a:t>Distribution and CPU interfaces</a:t>
             </a:r>
             <a:endParaRPr lang="en-US" altLang="ko-KR" sz="2000" kern="1200" dirty="0" smtClean="0">
               <a:latin typeface="Arial" pitchFamily="34" charset="0"/>
@@ -9185,11 +9356,7 @@
           <a:p>
             <a:r>
               <a:rPr lang="en-US" altLang="ko-KR" sz="3600" dirty="0" smtClean="0"/>
-              <a:t>GIC-400 Interrupt </a:t>
-            </a:r>
-            <a:r>
-              <a:rPr lang="en-US" altLang="ko-KR" sz="3600" dirty="0" smtClean="0"/>
-              <a:t>Controller</a:t>
+              <a:t>GIC-400 Interrupt Controller</a:t>
             </a:r>
             <a:br>
               <a:rPr lang="en-US" altLang="ko-KR" sz="3600" dirty="0" smtClean="0"/>
@@ -9198,7 +9365,6 @@
               <a:rPr lang="en-US" altLang="ko-KR" sz="3600" dirty="0" smtClean="0"/>
               <a:t>Distributer Side</a:t>
             </a:r>
-            <a:endParaRPr lang="en-US" altLang="ko-KR" sz="3600" dirty="0" smtClean="0"/>
           </a:p>
         </p:txBody>
       </p:sp>
@@ -9225,19 +9391,7 @@
             <a:pPr marL="347472" indent="-347472"/>
             <a:r>
               <a:rPr lang="en-US" altLang="ko-KR" sz="2200" dirty="0" smtClean="0"/>
-              <a:t>The  ARM Generic Interrupt Controller, </a:t>
-            </a:r>
-            <a:r>
-              <a:rPr lang="en-US" altLang="ko-KR" sz="2200" dirty="0" smtClean="0"/>
-              <a:t>the </a:t>
-            </a:r>
-            <a:r>
-              <a:rPr lang="en-US" altLang="ko-KR" sz="2200" dirty="0" smtClean="0"/>
-              <a:t>GIC-400, is a high-performance, area-optimized interrupt controller with an Advanced Microcontroller Bus Architecture (AMBA) Advanced eXtensible Interface (AXI) interface</a:t>
-            </a:r>
-            <a:r>
-              <a:rPr lang="en-US" altLang="ko-KR" sz="2200" dirty="0" smtClean="0"/>
-              <a:t>.</a:t>
+              <a:t>The  ARM Generic Interrupt Controller, the GIC-400, is a high-performance, area-optimized interrupt controller with an Advanced Microcontroller Bus Architecture (AMBA) Advanced eXtensible Interface (AXI) interface.</a:t>
             </a:r>
           </a:p>
           <a:p>
@@ -9260,7 +9414,6 @@
               <a:rPr lang="en-US" altLang="ko-KR" sz="2200" dirty="0" smtClean="0"/>
               <a:t>4 special purpose interrupts </a:t>
             </a:r>
-            <a:endParaRPr lang="en-US" altLang="ko-KR" sz="2200" dirty="0" smtClean="0"/>
           </a:p>
           <a:p>
             <a:pPr marL="644335" lvl="1" indent="-347472"/>
@@ -9289,7 +9442,6 @@
               <a:rPr lang="en-US" altLang="ko-KR" sz="2200" dirty="0" smtClean="0"/>
               <a:t>Note – These are banked ID, meaning, same ID for different interrupts (for different CPU)</a:t>
             </a:r>
-            <a:endParaRPr lang="en-US" altLang="ko-KR" sz="2200" dirty="0" smtClean="0"/>
           </a:p>
         </p:txBody>
       </p:sp>
@@ -9348,11 +9500,7 @@
           <a:p>
             <a:r>
               <a:rPr lang="en-US" altLang="ko-KR" sz="3600" dirty="0" smtClean="0"/>
-              <a:t>GIC-400 Interrupt </a:t>
-            </a:r>
-            <a:r>
-              <a:rPr lang="en-US" altLang="ko-KR" sz="3600" dirty="0" smtClean="0"/>
-              <a:t>Controller</a:t>
+              <a:t>GIC-400 Interrupt Controller</a:t>
             </a:r>
             <a:br>
               <a:rPr lang="en-US" altLang="ko-KR" sz="3600" dirty="0" smtClean="0"/>
@@ -9361,7 +9509,6 @@
               <a:rPr lang="en-US" altLang="ko-KR" sz="3600" dirty="0" smtClean="0"/>
               <a:t>CPU Interface</a:t>
             </a:r>
-            <a:endParaRPr lang="en-US" altLang="ko-KR" sz="3600" dirty="0" smtClean="0"/>
           </a:p>
         </p:txBody>
       </p:sp>
@@ -9430,15 +9577,7 @@
             <a:pPr marL="644335" lvl="1" indent="-347472"/>
             <a:r>
               <a:rPr lang="en-US" altLang="ko-KR" sz="2400" dirty="0" smtClean="0"/>
-              <a:t>Status of interrupt is changing from </a:t>
-            </a:r>
-            <a:r>
-              <a:rPr lang="en-US" altLang="ko-KR" sz="2400" dirty="0" smtClean="0"/>
-              <a:t>p</a:t>
-            </a:r>
-            <a:r>
-              <a:rPr lang="en-US" altLang="ko-KR" sz="2400" dirty="0" smtClean="0"/>
-              <a:t>ending to active or active pending, enable other interrupts </a:t>
+              <a:t>Status of interrupt is changing from pending to active or active pending, enable other interrupts </a:t>
             </a:r>
           </a:p>
         </p:txBody>
@@ -9590,11 +9729,7 @@
             </a:pPr>
             <a:r>
               <a:rPr lang="en-US" sz="2000" dirty="0" smtClean="0"/>
-              <a:t>L1 Memory: 32KB L1 Data cache 32KB L1 Program </a:t>
-            </a:r>
-            <a:r>
-              <a:rPr lang="en-US" sz="2000" dirty="0" smtClean="0"/>
-              <a:t>Cache</a:t>
+              <a:t>L1 Memory: 32KB L1 Data cache 32KB L1 Program Cache</a:t>
             </a:r>
           </a:p>
           <a:p>
@@ -9624,7 +9759,6 @@
               <a:rPr lang="en-US" sz="2000" dirty="0" smtClean="0"/>
               <a:t>64 bytes L1 D cache line (up to 6 outstanding requests)</a:t>
             </a:r>
-            <a:endParaRPr lang="en-US" sz="2000" dirty="0" smtClean="0"/>
           </a:p>
           <a:p>
             <a:pPr marL="227013" lvl="1" indent="-227013" eaLnBrk="1" hangingPunct="1">
@@ -9646,13 +9780,8 @@
             </a:r>
             <a:r>
               <a:rPr lang="en-US" sz="2000" dirty="0" smtClean="0"/>
-              <a:t>4 MB L2 Cache is shared between the 1 to 4 ARM A-15 core(s</a:t>
-            </a:r>
-            <a:r>
-              <a:rPr lang="en-US" sz="2000" dirty="0" smtClean="0"/>
-              <a:t>) (4 tag bank, 4 data bank each)</a:t>
-            </a:r>
-            <a:endParaRPr lang="en-US" sz="2000" dirty="0" smtClean="0"/>
+              <a:t>4 MB L2 Cache is shared between the 1 to 4 ARM A-15 core(s) (4 tag bank, 4 data bank each)</a:t>
+            </a:r>
           </a:p>
           <a:p>
             <a:pPr marL="227013" indent="-227013" eaLnBrk="1" hangingPunct="1">
@@ -9704,7 +9833,7 @@
     </p:custDataLst>
     <p:extLst>
       <p:ext uri="{BB962C8B-B14F-4D97-AF65-F5344CB8AC3E}">
-        <p14:creationId xmlns="" xmlns:p14="http://schemas.microsoft.com/office/powerpoint/2010/main" val="3469200570"/>
+        <p14:creationId xmlns:p14="http://schemas.microsoft.com/office/powerpoint/2010/main" xmlns="" val="3469200570"/>
       </p:ext>
     </p:extLst>
   </p:cSld>
@@ -10412,13 +10541,8 @@
             <a:pPr lvl="1"/>
             <a:r>
               <a:rPr lang="en-US" sz="2400" dirty="0" smtClean="0"/>
-              <a:t>Enable event from one CPU to trigger trace at another CPU</a:t>
-            </a:r>
-            <a:r>
-              <a:rPr lang="en-US" sz="2400" dirty="0" smtClean="0"/>
-              <a:t> </a:t>
-            </a:r>
-            <a:endParaRPr lang="en-US" sz="2400" dirty="0" smtClean="0"/>
+              <a:t>Enable event from one CPU to trigger trace at another CPU </a:t>
+            </a:r>
           </a:p>
         </p:txBody>
       </p:sp>
@@ -10517,11 +10641,7 @@
             <a:pPr lvl="1"/>
             <a:r>
               <a:rPr lang="en-US" dirty="0" smtClean="0"/>
-              <a:t>GNU Debugger (GDB</a:t>
-            </a:r>
-            <a:r>
-              <a:rPr lang="en-US" dirty="0" smtClean="0"/>
-              <a:t>)</a:t>
+              <a:t>GNU Debugger (GDB)</a:t>
             </a:r>
           </a:p>
           <a:p>
@@ -10665,11 +10785,7 @@
           <a:p>
             <a:r>
               <a:rPr lang="en-US" sz="3600" dirty="0" smtClean="0"/>
-              <a:t>Trace </a:t>
-            </a:r>
-            <a:r>
-              <a:rPr lang="en-US" sz="3600" dirty="0" smtClean="0"/>
-              <a:t>Macrocell</a:t>
+              <a:t>Trace Macrocell</a:t>
             </a:r>
             <a:endParaRPr lang="en-US" sz="3600" dirty="0"/>
           </a:p>
@@ -10842,11 +10958,7 @@
           <a:p>
             <a:r>
               <a:rPr lang="en-US" sz="2800" dirty="0" smtClean="0"/>
-              <a:t>Options </a:t>
-            </a:r>
-            <a:r>
-              <a:rPr lang="en-US" sz="2800" dirty="0" smtClean="0"/>
-              <a:t>for storing and delivering trace data to host:</a:t>
+              <a:t>Options for storing and delivering trace data to host:</a:t>
             </a:r>
           </a:p>
           <a:p>
@@ -10965,13 +11077,8 @@
             </a:r>
             <a:r>
               <a:rPr lang="en-US" sz="4000" dirty="0" smtClean="0"/>
-              <a:t>KeyStone II and ARM </a:t>
-            </a:r>
-            <a:r>
-              <a:rPr lang="en-US" sz="4000" dirty="0" smtClean="0"/>
-              <a:t>CorePac (2)</a:t>
-            </a:r>
-            <a:endParaRPr lang="en-US" sz="4000" dirty="0" smtClean="0"/>
+              <a:t>KeyStone II and ARM CorePac (2)</a:t>
+            </a:r>
           </a:p>
         </p:txBody>
       </p:sp>
@@ -11005,11 +11112,7 @@
             </a:pPr>
             <a:r>
               <a:rPr lang="en-US" sz="2000" dirty="0" smtClean="0"/>
-              <a:t>AMBA </a:t>
-            </a:r>
-            <a:r>
-              <a:rPr lang="en-US" sz="2000" dirty="0" smtClean="0"/>
-              <a:t>4.0 AXI Coherency Extension (ACE) master port</a:t>
+              <a:t>AMBA 4.0 AXI Coherency Extension (ACE) master port</a:t>
             </a:r>
           </a:p>
           <a:p>
@@ -11041,11 +11144,7 @@
             </a:pPr>
             <a:r>
               <a:rPr lang="en-US" sz="2000" dirty="0" smtClean="0"/>
-              <a:t>Cluster-level and core-level power management and low-power standby </a:t>
-            </a:r>
-            <a:r>
-              <a:rPr lang="en-US" sz="2000" dirty="0" smtClean="0"/>
-              <a:t>modes</a:t>
+              <a:t>Cluster-level and core-level power management and low-power standby modes</a:t>
             </a:r>
           </a:p>
           <a:p>
@@ -11059,13 +11158,8 @@
             </a:pPr>
             <a:r>
               <a:rPr lang="en-US" sz="2000" dirty="0" smtClean="0"/>
-              <a:t>Configured 64/128 bit AMBA interface and 64/128 bits accelerator coherency support (ACP</a:t>
-            </a:r>
-            <a:r>
-              <a:rPr lang="en-US" sz="2000" dirty="0" smtClean="0"/>
-              <a:t>)</a:t>
-            </a:r>
-            <a:endParaRPr lang="en-US" sz="2000" dirty="0" smtClean="0"/>
+              <a:t>Configured 64/128 bit AMBA interface and 64/128 bits accelerator coherency support (ACP)</a:t>
+            </a:r>
           </a:p>
           <a:p>
             <a:pPr marL="227013" indent="-227013" eaLnBrk="1" hangingPunct="1">
@@ -11128,7 +11222,7 @@
     </p:custDataLst>
     <p:extLst>
       <p:ext uri="{BB962C8B-B14F-4D97-AF65-F5344CB8AC3E}">
-        <p14:creationId xmlns="" xmlns:p14="http://schemas.microsoft.com/office/powerpoint/2010/main" val="3469200570"/>
+        <p14:creationId xmlns:p14="http://schemas.microsoft.com/office/powerpoint/2010/main" xmlns="" val="3469200570"/>
       </p:ext>
     </p:extLst>
   </p:cSld>
@@ -11431,8 +11525,13 @@
           <a:p>
             <a:r>
               <a:rPr lang="en-US" sz="2800" dirty="0" smtClean="0"/>
-              <a:t>CTI controls the trigger interface</a:t>
-            </a:r>
+              <a:t>CTI controls the trigger </a:t>
+            </a:r>
+            <a:r>
+              <a:rPr lang="en-US" sz="2800" dirty="0" smtClean="0"/>
+              <a:t>interface for each CPU</a:t>
+            </a:r>
+            <a:endParaRPr lang="en-US" sz="2800" dirty="0" smtClean="0"/>
           </a:p>
           <a:p>
             <a:pPr lvl="1"/>
@@ -11445,21 +11544,42 @@
             <a:pPr lvl="1"/>
             <a:r>
               <a:rPr lang="en-US" sz="2400" dirty="0" smtClean="0"/>
-              <a:t>Broadcasts trigger requests to all other interfaces on the SOC</a:t>
+              <a:t>Enables the debug logic, PTM and PMU to interact with each other and with other </a:t>
+            </a:r>
+            <a:r>
+              <a:rPr lang="en-US" sz="2400" dirty="0" err="1" smtClean="0"/>
+              <a:t>CoreSight</a:t>
+            </a:r>
+            <a:r>
+              <a:rPr lang="en-US" sz="2400" dirty="0" smtClean="0"/>
+              <a:t> component</a:t>
             </a:r>
           </a:p>
           <a:p>
             <a:r>
               <a:rPr lang="en-US" sz="2800" dirty="0" smtClean="0"/>
-              <a:t>CTM controls the distribution of events</a:t>
+              <a:t>CTM </a:t>
+            </a:r>
+            <a:r>
+              <a:rPr lang="en-US" sz="2800" dirty="0" smtClean="0"/>
+              <a:t>controls the distribution of </a:t>
+            </a:r>
+            <a:r>
+              <a:rPr lang="en-US" sz="2800" dirty="0" smtClean="0"/>
+              <a:t>events across CPUs and from external modules</a:t>
             </a:r>
           </a:p>
           <a:p>
             <a:pPr lvl="1"/>
             <a:r>
               <a:rPr lang="en-US" sz="2400" dirty="0" smtClean="0"/>
-              <a:t>Enables multiple ECTs be connected to each other (channel interface)</a:t>
-            </a:r>
+              <a:t>M</a:t>
+            </a:r>
+            <a:r>
+              <a:rPr lang="en-US" sz="2400" dirty="0" smtClean="0"/>
+              <a:t>atrix connections. Number of trigger inputs and trigger outputs are connected between debug components in the MPCore and CTIs.</a:t>
+            </a:r>
+            <a:endParaRPr lang="en-US" sz="2400" dirty="0" smtClean="0"/>
           </a:p>
         </p:txBody>
       </p:sp>
@@ -11577,6 +11697,99 @@
 </file>
 
 <file path=ppt/slides/slide54.xml><?xml version="1.0" encoding="utf-8"?>
+<p:sld xmlns:a="http://schemas.openxmlformats.org/drawingml/2006/main" xmlns:r="http://schemas.openxmlformats.org/officeDocument/2006/relationships" xmlns:p="http://schemas.openxmlformats.org/presentationml/2006/main" show="0">
+  <p:cSld>
+    <p:spTree>
+      <p:nvGrpSpPr>
+        <p:cNvPr id="1" name=""/>
+        <p:cNvGrpSpPr/>
+        <p:nvPr/>
+      </p:nvGrpSpPr>
+      <p:grpSpPr>
+        <a:xfrm>
+          <a:off x="0" y="0"/>
+          <a:ext cx="0" cy="0"/>
+          <a:chOff x="0" y="0"/>
+          <a:chExt cx="0" cy="0"/>
+        </a:xfrm>
+      </p:grpSpPr>
+      <p:sp>
+        <p:nvSpPr>
+          <p:cNvPr id="2" name="Title 1"/>
+          <p:cNvSpPr>
+            <a:spLocks noGrp="1"/>
+          </p:cNvSpPr>
+          <p:nvPr>
+            <p:ph type="title"/>
+          </p:nvPr>
+        </p:nvSpPr>
+        <p:spPr/>
+        <p:txBody>
+          <a:bodyPr>
+            <a:normAutofit/>
+          </a:bodyPr>
+          <a:lstStyle/>
+          <a:p>
+            <a:r>
+              <a:rPr lang="en-US" sz="3600" dirty="0" smtClean="0"/>
+              <a:t>CTI and CTM signals</a:t>
+            </a:r>
+            <a:endParaRPr lang="en-US" sz="3600" dirty="0"/>
+          </a:p>
+        </p:txBody>
+      </p:sp>
+      <p:pic>
+        <p:nvPicPr>
+          <p:cNvPr id="134146" name="Picture 2"/>
+          <p:cNvPicPr>
+            <a:picLocks noChangeAspect="1" noChangeArrowheads="1"/>
+          </p:cNvPicPr>
+          <p:nvPr/>
+        </p:nvPicPr>
+        <p:blipFill>
+          <a:blip r:embed="rId4" cstate="print"/>
+          <a:srcRect/>
+          <a:stretch>
+            <a:fillRect/>
+          </a:stretch>
+        </p:blipFill>
+        <p:spPr bwMode="auto">
+          <a:xfrm>
+            <a:off x="1469984" y="948437"/>
+            <a:ext cx="5611733" cy="5268918"/>
+          </a:xfrm>
+          <a:prstGeom prst="rect">
+            <a:avLst/>
+          </a:prstGeom>
+          <a:noFill/>
+          <a:ln w="9525">
+            <a:noFill/>
+            <a:miter lim="800000"/>
+            <a:headEnd/>
+            <a:tailEnd/>
+          </a:ln>
+        </p:spPr>
+      </p:pic>
+    </p:spTree>
+    <p:custDataLst>
+      <p:tags r:id="rId1"/>
+    </p:custDataLst>
+  </p:cSld>
+  <p:clrMapOvr>
+    <a:masterClrMapping/>
+  </p:clrMapOvr>
+  <p:transition/>
+  <p:timing>
+    <p:tnLst>
+      <p:par>
+        <p:cTn id="1" dur="indefinite" restart="never" nodeType="tmRoot"/>
+      </p:par>
+    </p:tnLst>
+  </p:timing>
+</p:sld>
+</file>
+
+<file path=ppt/slides/slide55.xml><?xml version="1.0" encoding="utf-8"?>
 <p:sld xmlns:a="http://schemas.openxmlformats.org/drawingml/2006/main" xmlns:r="http://schemas.openxmlformats.org/officeDocument/2006/relationships" xmlns:p="http://schemas.openxmlformats.org/presentationml/2006/main">
   <p:cSld>
     <p:spTree>
@@ -11864,7 +12077,7 @@
 </p:sld>
 </file>
 
-<file path=ppt/slides/slide55.xml><?xml version="1.0" encoding="utf-8"?>
+<file path=ppt/slides/slide56.xml><?xml version="1.0" encoding="utf-8"?>
 <p:sld xmlns:a="http://schemas.openxmlformats.org/drawingml/2006/main" xmlns:r="http://schemas.openxmlformats.org/officeDocument/2006/relationships" xmlns:p="http://schemas.openxmlformats.org/presentationml/2006/main">
   <p:cSld>
     <p:spTree>
@@ -12772,6 +12985,18 @@
 
 <file path=ppt/tags/tag26.xml><?xml version="1.0" encoding="utf-8"?>
 <p:tagLst xmlns:a="http://schemas.openxmlformats.org/drawingml/2006/main" xmlns:r="http://schemas.openxmlformats.org/officeDocument/2006/relationships" xmlns:p="http://schemas.openxmlformats.org/presentationml/2006/main">
+  <p:tag name="ELAPSEDTIME" val="80.322"/>
+  <p:tag name="ARTICULATE_SLIDE_PAUSE" val="0"/>
+  <p:tag name="ARTICULATE_NAV_LEVEL" val="1"/>
+  <p:tag name="ARTICULATE_PLAYLIST_ID" val="-1"/>
+  <p:tag name="ARTICULATE_LOCK_SLIDE" val="0"/>
+  <p:tag name="ARTICULATE_SLIDE_GUID" val="6d983b37-ed36-4d89-91eb-86a0ebbb8b1c"/>
+  <p:tag name="ARTICULATE_SLIDE_NAV" val="11"/>
+</p:tagLst>
+</file>
+
+<file path=ppt/tags/tag27.xml><?xml version="1.0" encoding="utf-8"?>
+<p:tagLst xmlns:a="http://schemas.openxmlformats.org/drawingml/2006/main" xmlns:r="http://schemas.openxmlformats.org/officeDocument/2006/relationships" xmlns:p="http://schemas.openxmlformats.org/presentationml/2006/main">
   <p:tag name="ELAPSEDTIME" val="85.416"/>
   <p:tag name="ARTICULATE_SLIDE_PAUSE" val="0"/>
   <p:tag name="ARTICULATE_NAV_LEVEL" val="1"/>
@@ -12782,14 +13007,14 @@
 </p:tagLst>
 </file>
 
-<file path=ppt/tags/tag27.xml><?xml version="1.0" encoding="utf-8"?>
+<file path=ppt/tags/tag28.xml><?xml version="1.0" encoding="utf-8"?>
 <p:tagLst xmlns:a="http://schemas.openxmlformats.org/drawingml/2006/main" xmlns:r="http://schemas.openxmlformats.org/officeDocument/2006/relationships" xmlns:p="http://schemas.openxmlformats.org/presentationml/2006/main">
   <p:tag name="ARTICULATE_PUBLISH_MODE" val="2"/>
   <p:tag name="ARTICULATE_SOURCE_IMAGE" val="C:\Users\a0850458\AppData\Local\Temp\articulate\presenter\imgtemp\IJc0dKkU_files\slide0001_image001.gif"/>
 </p:tagLst>
 </file>
 
-<file path=ppt/tags/tag28.xml><?xml version="1.0" encoding="utf-8"?>
+<file path=ppt/tags/tag29.xml><?xml version="1.0" encoding="utf-8"?>
 <p:tagLst xmlns:a="http://schemas.openxmlformats.org/drawingml/2006/main" xmlns:r="http://schemas.openxmlformats.org/officeDocument/2006/relationships" xmlns:p="http://schemas.openxmlformats.org/presentationml/2006/main">
   <p:tag name="ELAPSEDTIME" val="34.635"/>
   <p:tag name="ARTICULATE_SLIDE_PAUSE" val="0"/>
@@ -13824,10 +14049,6 @@
 </file>
 
 <file path=customXml/item1.xml><?xml version="1.0" encoding="utf-8"?>
-<LongProperties xmlns="http://schemas.microsoft.com/office/2006/metadata/longProperties"/>
-</file>
-
-<file path=customXml/item2.xml><?xml version="1.0" encoding="utf-8"?>
 <ct:contentTypeSchema xmlns:ct="http://schemas.microsoft.com/office/2006/metadata/contentType" xmlns:ma="http://schemas.microsoft.com/office/2006/metadata/properties/metaAttributes" ct:_="" ma:_="" ma:contentTypeName="Document" ma:contentTypeID="0x0101006BF34EDD2AB14F49969AD5B68D65D28C" ma:contentTypeVersion="1" ma:contentTypeDescription="Create a new document." ma:contentTypeScope="" ma:versionID="aec3fda75a9471671297bbb4606d1d91">
   <xsd:schema xmlns:xsd="http://www.w3.org/2001/XMLSchema" xmlns:p="http://schemas.microsoft.com/office/2006/metadata/properties" xmlns:ns2="99c847d8-566e-43ce-87b7-3c417d164c47" targetNamespace="http://schemas.microsoft.com/office/2006/metadata/properties" ma:root="true" ma:fieldsID="6b49c4b1e87cfd71c9528e3cb8636bc2" ns2:_="">
     <xsd:import namespace="99c847d8-566e-43ce-87b7-3c417d164c47"/>
@@ -13889,7 +14110,19 @@
 </ct:contentTypeSchema>
 </file>
 
+<file path=customXml/item2.xml><?xml version="1.0" encoding="utf-8"?>
+<LongProperties xmlns="http://schemas.microsoft.com/office/2006/metadata/longProperties"/>
+</file>
+
 <file path=customXml/item3.xml><?xml version="1.0" encoding="utf-8"?>
+<p:properties xmlns:p="http://schemas.microsoft.com/office/2006/metadata/properties" xmlns:xsi="http://www.w3.org/2001/XMLSchema-instance">
+  <documentManagement>
+    <Content_x0020_Owner xmlns="99c847d8-566e-43ce-87b7-3c417d164c47">Ramroop, Saffie</Content_x0020_Owner>
+  </documentManagement>
+</p:properties>
+</file>
+
+<file path=customXml/item4.xml><?xml version="1.0" encoding="utf-8"?>
 <?mso-contentType ?>
 <FormTemplates xmlns="http://schemas.microsoft.com/sharepoint/v3/contenttype/forms">
   <Display>DocumentLibraryForm</Display>
@@ -13898,23 +14131,7 @@
 </FormTemplates>
 </file>
 
-<file path=customXml/item4.xml><?xml version="1.0" encoding="utf-8"?>
-<p:properties xmlns:p="http://schemas.microsoft.com/office/2006/metadata/properties" xmlns:xsi="http://www.w3.org/2001/XMLSchema-instance">
-  <documentManagement>
-    <Content_x0020_Owner xmlns="99c847d8-566e-43ce-87b7-3c417d164c47">Ramroop, Saffie</Content_x0020_Owner>
-  </documentManagement>
-</p:properties>
-</file>
-
 <file path=customXml/itemProps1.xml><?xml version="1.0" encoding="utf-8"?>
-<ds:datastoreItem xmlns:ds="http://schemas.openxmlformats.org/officeDocument/2006/customXml" ds:itemID="{08087394-933C-48A1-8AD9-030539CA3EF7}">
-  <ds:schemaRefs>
-    <ds:schemaRef ds:uri="http://schemas.microsoft.com/office/2006/metadata/longProperties"/>
-  </ds:schemaRefs>
-</ds:datastoreItem>
-</file>
-
-<file path=customXml/itemProps2.xml><?xml version="1.0" encoding="utf-8"?>
 <ds:datastoreItem xmlns:ds="http://schemas.openxmlformats.org/officeDocument/2006/customXml" ds:itemID="{83529300-F1B4-4E63-A67B-9E50D1598C67}">
   <ds:schemaRefs>
     <ds:schemaRef ds:uri="http://schemas.microsoft.com/office/2006/metadata/contentType"/>
@@ -13931,19 +14148,27 @@
 </ds:datastoreItem>
 </file>
 
-<file path=customXml/itemProps3.xml><?xml version="1.0" encoding="utf-8"?>
-<ds:datastoreItem xmlns:ds="http://schemas.openxmlformats.org/officeDocument/2006/customXml" ds:itemID="{9247FEFF-82D0-4BBE-AA2E-6E8C28F7BBE5}">
+<file path=customXml/itemProps2.xml><?xml version="1.0" encoding="utf-8"?>
+<ds:datastoreItem xmlns:ds="http://schemas.openxmlformats.org/officeDocument/2006/customXml" ds:itemID="{08087394-933C-48A1-8AD9-030539CA3EF7}">
   <ds:schemaRefs>
-    <ds:schemaRef ds:uri="http://schemas.microsoft.com/sharepoint/v3/contenttype/forms"/>
+    <ds:schemaRef ds:uri="http://schemas.microsoft.com/office/2006/metadata/longProperties"/>
   </ds:schemaRefs>
 </ds:datastoreItem>
 </file>
 
-<file path=customXml/itemProps4.xml><?xml version="1.0" encoding="utf-8"?>
+<file path=customXml/itemProps3.xml><?xml version="1.0" encoding="utf-8"?>
 <ds:datastoreItem xmlns:ds="http://schemas.openxmlformats.org/officeDocument/2006/customXml" ds:itemID="{7CBBC1DF-22C6-4C0C-A1CC-096D390C1463}">
   <ds:schemaRefs>
     <ds:schemaRef ds:uri="http://schemas.microsoft.com/office/2006/metadata/properties"/>
     <ds:schemaRef ds:uri="99c847d8-566e-43ce-87b7-3c417d164c47"/>
   </ds:schemaRefs>
 </ds:datastoreItem>
+</file>
+
+<file path=customXml/itemProps4.xml><?xml version="1.0" encoding="utf-8"?>
+<ds:datastoreItem xmlns:ds="http://schemas.openxmlformats.org/officeDocument/2006/customXml" ds:itemID="{9247FEFF-82D0-4BBE-AA2E-6E8C28F7BBE5}">
+  <ds:schemaRefs>
+    <ds:schemaRef ds:uri="http://schemas.microsoft.com/sharepoint/v3/contenttype/forms"/>
+  </ds:schemaRefs>
+</ds:datastoreItem>
 </file>
</xml_diff>